<commit_message>
Updated test cases for distribute
</commit_message>
<xml_diff>
--- a/doc/test/PositionsLab/PositionsLabDistribute.pptx
+++ b/doc/test/PositionsLab/PositionsLabDistribute.pptx
@@ -20,12 +20,12 @@
     <p:sldId id="364" r:id="rId14"/>
     <p:sldId id="365" r:id="rId15"/>
     <p:sldId id="366" r:id="rId16"/>
-    <p:sldId id="367" r:id="rId17"/>
-    <p:sldId id="368" r:id="rId18"/>
+    <p:sldId id="402" r:id="rId17"/>
+    <p:sldId id="408" r:id="rId18"/>
     <p:sldId id="369" r:id="rId19"/>
     <p:sldId id="370" r:id="rId20"/>
-    <p:sldId id="371" r:id="rId21"/>
-    <p:sldId id="372" r:id="rId22"/>
+    <p:sldId id="404" r:id="rId21"/>
+    <p:sldId id="411" r:id="rId22"/>
     <p:sldId id="374" r:id="rId23"/>
     <p:sldId id="375" r:id="rId24"/>
     <p:sldId id="392" r:id="rId25"/>
@@ -35,13 +35,13 @@
     <p:sldId id="394" r:id="rId29"/>
     <p:sldId id="395" r:id="rId30"/>
     <p:sldId id="383" r:id="rId31"/>
-    <p:sldId id="396" r:id="rId32"/>
-    <p:sldId id="397" r:id="rId33"/>
-    <p:sldId id="398" r:id="rId34"/>
+    <p:sldId id="406" r:id="rId32"/>
+    <p:sldId id="403" r:id="rId33"/>
+    <p:sldId id="412" r:id="rId34"/>
     <p:sldId id="387" r:id="rId35"/>
-    <p:sldId id="399" r:id="rId36"/>
-    <p:sldId id="400" r:id="rId37"/>
-    <p:sldId id="401" r:id="rId38"/>
+    <p:sldId id="407" r:id="rId36"/>
+    <p:sldId id="405" r:id="rId37"/>
+    <p:sldId id="410" r:id="rId38"/>
     <p:sldId id="274" r:id="rId39"/>
   </p:sldIdLst>
   <p:sldSz cx="9144000" cy="6858000" type="screen4x3"/>
@@ -163,12 +163,12 @@
             <p14:sldId id="364"/>
             <p14:sldId id="365"/>
             <p14:sldId id="366"/>
-            <p14:sldId id="367"/>
-            <p14:sldId id="368"/>
+            <p14:sldId id="402"/>
+            <p14:sldId id="408"/>
             <p14:sldId id="369"/>
             <p14:sldId id="370"/>
-            <p14:sldId id="371"/>
-            <p14:sldId id="372"/>
+            <p14:sldId id="404"/>
+            <p14:sldId id="411"/>
             <p14:sldId id="374"/>
             <p14:sldId id="375"/>
             <p14:sldId id="392"/>
@@ -178,13 +178,13 @@
             <p14:sldId id="394"/>
             <p14:sldId id="395"/>
             <p14:sldId id="383"/>
-            <p14:sldId id="396"/>
-            <p14:sldId id="397"/>
-            <p14:sldId id="398"/>
+            <p14:sldId id="406"/>
+            <p14:sldId id="403"/>
+            <p14:sldId id="412"/>
             <p14:sldId id="387"/>
-            <p14:sldId id="399"/>
-            <p14:sldId id="400"/>
-            <p14:sldId id="401"/>
+            <p14:sldId id="407"/>
+            <p14:sldId id="405"/>
+            <p14:sldId id="410"/>
             <p14:sldId id="274"/>
           </p14:sldIdLst>
         </p14:section>
@@ -376,7 +376,7 @@
           <a:p>
             <a:fld id="{699DC775-C286-4358-8C92-D7E584E969B3}" type="datetimeFigureOut">
               <a:rPr lang="en-US" smtClean="0"/>
-              <a:t>3/27/2016</a:t>
+              <a:t>4/8/2016</a:t>
             </a:fld>
             <a:endParaRPr lang="en-US"/>
           </a:p>
@@ -544,7 +544,7 @@
           <a:p>
             <a:fld id="{699DC775-C286-4358-8C92-D7E584E969B3}" type="datetimeFigureOut">
               <a:rPr lang="en-US" smtClean="0"/>
-              <a:t>3/27/2016</a:t>
+              <a:t>4/8/2016</a:t>
             </a:fld>
             <a:endParaRPr lang="en-US"/>
           </a:p>
@@ -722,7 +722,7 @@
           <a:p>
             <a:fld id="{699DC775-C286-4358-8C92-D7E584E969B3}" type="datetimeFigureOut">
               <a:rPr lang="en-US" smtClean="0"/>
-              <a:t>3/27/2016</a:t>
+              <a:t>4/8/2016</a:t>
             </a:fld>
             <a:endParaRPr lang="en-US"/>
           </a:p>
@@ -962,7 +962,7 @@
           <a:p>
             <a:fld id="{699DC775-C286-4358-8C92-D7E584E969B3}" type="datetimeFigureOut">
               <a:rPr lang="en-US" smtClean="0"/>
-              <a:t>3/27/2016</a:t>
+              <a:t>4/8/2016</a:t>
             </a:fld>
             <a:endParaRPr lang="en-US"/>
           </a:p>
@@ -1130,7 +1130,7 @@
           <a:p>
             <a:fld id="{699DC775-C286-4358-8C92-D7E584E969B3}" type="datetimeFigureOut">
               <a:rPr lang="en-US" smtClean="0"/>
-              <a:t>3/27/2016</a:t>
+              <a:t>4/8/2016</a:t>
             </a:fld>
             <a:endParaRPr lang="en-US"/>
           </a:p>
@@ -1375,7 +1375,7 @@
           <a:p>
             <a:fld id="{699DC775-C286-4358-8C92-D7E584E969B3}" type="datetimeFigureOut">
               <a:rPr lang="en-US" smtClean="0"/>
-              <a:t>3/27/2016</a:t>
+              <a:t>4/8/2016</a:t>
             </a:fld>
             <a:endParaRPr lang="en-US"/>
           </a:p>
@@ -1660,7 +1660,7 @@
           <a:p>
             <a:fld id="{699DC775-C286-4358-8C92-D7E584E969B3}" type="datetimeFigureOut">
               <a:rPr lang="en-US" smtClean="0"/>
-              <a:t>3/27/2016</a:t>
+              <a:t>4/8/2016</a:t>
             </a:fld>
             <a:endParaRPr lang="en-US"/>
           </a:p>
@@ -2079,7 +2079,7 @@
           <a:p>
             <a:fld id="{699DC775-C286-4358-8C92-D7E584E969B3}" type="datetimeFigureOut">
               <a:rPr lang="en-US" smtClean="0"/>
-              <a:t>3/27/2016</a:t>
+              <a:t>4/8/2016</a:t>
             </a:fld>
             <a:endParaRPr lang="en-US"/>
           </a:p>
@@ -2196,7 +2196,7 @@
           <a:p>
             <a:fld id="{699DC775-C286-4358-8C92-D7E584E969B3}" type="datetimeFigureOut">
               <a:rPr lang="en-US" smtClean="0"/>
-              <a:t>3/27/2016</a:t>
+              <a:t>4/8/2016</a:t>
             </a:fld>
             <a:endParaRPr lang="en-US"/>
           </a:p>
@@ -2291,7 +2291,7 @@
           <a:p>
             <a:fld id="{699DC775-C286-4358-8C92-D7E584E969B3}" type="datetimeFigureOut">
               <a:rPr lang="en-US" smtClean="0"/>
-              <a:t>3/27/2016</a:t>
+              <a:t>4/8/2016</a:t>
             </a:fld>
             <a:endParaRPr lang="en-US"/>
           </a:p>
@@ -2566,7 +2566,7 @@
           <a:p>
             <a:fld id="{699DC775-C286-4358-8C92-D7E584E969B3}" type="datetimeFigureOut">
               <a:rPr lang="en-US" smtClean="0"/>
-              <a:t>3/27/2016</a:t>
+              <a:t>4/8/2016</a:t>
             </a:fld>
             <a:endParaRPr lang="en-US"/>
           </a:p>
@@ -2734,7 +2734,7 @@
           <a:p>
             <a:fld id="{699DC775-C286-4358-8C92-D7E584E969B3}" type="datetimeFigureOut">
               <a:rPr lang="en-US" smtClean="0"/>
-              <a:t>3/27/2016</a:t>
+              <a:t>4/8/2016</a:t>
             </a:fld>
             <a:endParaRPr lang="en-US"/>
           </a:p>
@@ -2986,7 +2986,7 @@
           <a:p>
             <a:fld id="{699DC775-C286-4358-8C92-D7E584E969B3}" type="datetimeFigureOut">
               <a:rPr lang="en-US" smtClean="0"/>
-              <a:t>3/27/2016</a:t>
+              <a:t>4/8/2016</a:t>
             </a:fld>
             <a:endParaRPr lang="en-US"/>
           </a:p>
@@ -3154,7 +3154,7 @@
           <a:p>
             <a:fld id="{699DC775-C286-4358-8C92-D7E584E969B3}" type="datetimeFigureOut">
               <a:rPr lang="en-US" smtClean="0"/>
-              <a:t>3/27/2016</a:t>
+              <a:t>4/8/2016</a:t>
             </a:fld>
             <a:endParaRPr lang="en-US"/>
           </a:p>
@@ -3332,7 +3332,7 @@
           <a:p>
             <a:fld id="{699DC775-C286-4358-8C92-D7E584E969B3}" type="datetimeFigureOut">
               <a:rPr lang="en-US" smtClean="0"/>
-              <a:t>3/27/2016</a:t>
+              <a:t>4/8/2016</a:t>
             </a:fld>
             <a:endParaRPr lang="en-US"/>
           </a:p>
@@ -3580,7 +3580,7 @@
           <a:p>
             <a:fld id="{699DC775-C286-4358-8C92-D7E584E969B3}" type="datetimeFigureOut">
               <a:rPr lang="en-US" smtClean="0"/>
-              <a:t>3/27/2016</a:t>
+              <a:t>4/8/2016</a:t>
             </a:fld>
             <a:endParaRPr lang="en-US"/>
           </a:p>
@@ -3756,7 +3756,7 @@
           <a:p>
             <a:fld id="{699DC775-C286-4358-8C92-D7E584E969B3}" type="datetimeFigureOut">
               <a:rPr lang="en-US" smtClean="0"/>
-              <a:t>3/27/2016</a:t>
+              <a:t>4/8/2016</a:t>
             </a:fld>
             <a:endParaRPr lang="en-US"/>
           </a:p>
@@ -4009,7 +4009,7 @@
           <a:p>
             <a:fld id="{699DC775-C286-4358-8C92-D7E584E969B3}" type="datetimeFigureOut">
               <a:rPr lang="en-US" smtClean="0"/>
-              <a:t>3/27/2016</a:t>
+              <a:t>4/8/2016</a:t>
             </a:fld>
             <a:endParaRPr lang="en-US"/>
           </a:p>
@@ -4302,7 +4302,7 @@
           <a:p>
             <a:fld id="{699DC775-C286-4358-8C92-D7E584E969B3}" type="datetimeFigureOut">
               <a:rPr lang="en-US" smtClean="0"/>
-              <a:t>3/27/2016</a:t>
+              <a:t>4/8/2016</a:t>
             </a:fld>
             <a:endParaRPr lang="en-US"/>
           </a:p>
@@ -4729,7 +4729,7 @@
           <a:p>
             <a:fld id="{699DC775-C286-4358-8C92-D7E584E969B3}" type="datetimeFigureOut">
               <a:rPr lang="en-US" smtClean="0"/>
-              <a:t>3/27/2016</a:t>
+              <a:t>4/8/2016</a:t>
             </a:fld>
             <a:endParaRPr lang="en-US"/>
           </a:p>
@@ -4854,7 +4854,7 @@
           <a:p>
             <a:fld id="{699DC775-C286-4358-8C92-D7E584E969B3}" type="datetimeFigureOut">
               <a:rPr lang="en-US" smtClean="0"/>
-              <a:t>3/27/2016</a:t>
+              <a:t>4/8/2016</a:t>
             </a:fld>
             <a:endParaRPr lang="en-US"/>
           </a:p>
@@ -4957,7 +4957,7 @@
           <a:p>
             <a:fld id="{699DC775-C286-4358-8C92-D7E584E969B3}" type="datetimeFigureOut">
               <a:rPr lang="en-US" smtClean="0"/>
-              <a:t>3/27/2016</a:t>
+              <a:t>4/8/2016</a:t>
             </a:fld>
             <a:endParaRPr lang="en-US"/>
           </a:p>
@@ -5202,7 +5202,7 @@
           <a:p>
             <a:fld id="{699DC775-C286-4358-8C92-D7E584E969B3}" type="datetimeFigureOut">
               <a:rPr lang="en-US" smtClean="0"/>
-              <a:t>3/27/2016</a:t>
+              <a:t>4/8/2016</a:t>
             </a:fld>
             <a:endParaRPr lang="en-US"/>
           </a:p>
@@ -5485,7 +5485,7 @@
           <a:p>
             <a:fld id="{699DC775-C286-4358-8C92-D7E584E969B3}" type="datetimeFigureOut">
               <a:rPr lang="en-US" smtClean="0"/>
-              <a:t>3/27/2016</a:t>
+              <a:t>4/8/2016</a:t>
             </a:fld>
             <a:endParaRPr lang="en-US"/>
           </a:p>
@@ -5745,7 +5745,7 @@
           <a:p>
             <a:fld id="{699DC775-C286-4358-8C92-D7E584E969B3}" type="datetimeFigureOut">
               <a:rPr lang="en-US" smtClean="0"/>
-              <a:t>3/27/2016</a:t>
+              <a:t>4/8/2016</a:t>
             </a:fld>
             <a:endParaRPr lang="en-US"/>
           </a:p>
@@ -5921,7 +5921,7 @@
           <a:p>
             <a:fld id="{699DC775-C286-4358-8C92-D7E584E969B3}" type="datetimeFigureOut">
               <a:rPr lang="en-US" smtClean="0"/>
-              <a:t>3/27/2016</a:t>
+              <a:t>4/8/2016</a:t>
             </a:fld>
             <a:endParaRPr lang="en-US"/>
           </a:p>
@@ -6107,7 +6107,7 @@
           <a:p>
             <a:fld id="{699DC775-C286-4358-8C92-D7E584E969B3}" type="datetimeFigureOut">
               <a:rPr lang="en-US" smtClean="0"/>
-              <a:t>3/27/2016</a:t>
+              <a:t>4/8/2016</a:t>
             </a:fld>
             <a:endParaRPr lang="en-US"/>
           </a:p>
@@ -6392,7 +6392,7 @@
           <a:p>
             <a:fld id="{699DC775-C286-4358-8C92-D7E584E969B3}" type="datetimeFigureOut">
               <a:rPr lang="en-US" smtClean="0"/>
-              <a:t>3/27/2016</a:t>
+              <a:t>4/8/2016</a:t>
             </a:fld>
             <a:endParaRPr lang="en-US"/>
           </a:p>
@@ -6811,7 +6811,7 @@
           <a:p>
             <a:fld id="{699DC775-C286-4358-8C92-D7E584E969B3}" type="datetimeFigureOut">
               <a:rPr lang="en-US" smtClean="0"/>
-              <a:t>3/27/2016</a:t>
+              <a:t>4/8/2016</a:t>
             </a:fld>
             <a:endParaRPr lang="en-US"/>
           </a:p>
@@ -6928,7 +6928,7 @@
           <a:p>
             <a:fld id="{699DC775-C286-4358-8C92-D7E584E969B3}" type="datetimeFigureOut">
               <a:rPr lang="en-US" smtClean="0"/>
-              <a:t>3/27/2016</a:t>
+              <a:t>4/8/2016</a:t>
             </a:fld>
             <a:endParaRPr lang="en-US"/>
           </a:p>
@@ -7023,7 +7023,7 @@
           <a:p>
             <a:fld id="{699DC775-C286-4358-8C92-D7E584E969B3}" type="datetimeFigureOut">
               <a:rPr lang="en-US" smtClean="0"/>
-              <a:t>3/27/2016</a:t>
+              <a:t>4/8/2016</a:t>
             </a:fld>
             <a:endParaRPr lang="en-US"/>
           </a:p>
@@ -7298,7 +7298,7 @@
           <a:p>
             <a:fld id="{699DC775-C286-4358-8C92-D7E584E969B3}" type="datetimeFigureOut">
               <a:rPr lang="en-US" smtClean="0"/>
-              <a:t>3/27/2016</a:t>
+              <a:t>4/8/2016</a:t>
             </a:fld>
             <a:endParaRPr lang="en-US"/>
           </a:p>
@@ -7550,7 +7550,7 @@
           <a:p>
             <a:fld id="{699DC775-C286-4358-8C92-D7E584E969B3}" type="datetimeFigureOut">
               <a:rPr lang="en-US" smtClean="0"/>
-              <a:t>3/27/2016</a:t>
+              <a:t>4/8/2016</a:t>
             </a:fld>
             <a:endParaRPr lang="en-US"/>
           </a:p>
@@ -7761,7 +7761,7 @@
           <a:p>
             <a:fld id="{699DC775-C286-4358-8C92-D7E584E969B3}" type="datetimeFigureOut">
               <a:rPr lang="en-US" smtClean="0"/>
-              <a:t>3/27/2016</a:t>
+              <a:t>4/8/2016</a:t>
             </a:fld>
             <a:endParaRPr lang="en-US"/>
           </a:p>
@@ -8274,7 +8274,7 @@
           <a:p>
             <a:fld id="{699DC775-C286-4358-8C92-D7E584E969B3}" type="datetimeFigureOut">
               <a:rPr lang="en-US" smtClean="0"/>
-              <a:t>3/27/2016</a:t>
+              <a:t>4/8/2016</a:t>
             </a:fld>
             <a:endParaRPr lang="en-US"/>
           </a:p>
@@ -8785,7 +8785,7 @@
           <a:p>
             <a:fld id="{699DC775-C286-4358-8C92-D7E584E969B3}" type="datetimeFigureOut">
               <a:rPr lang="en-US" smtClean="0"/>
-              <a:t>3/27/2016</a:t>
+              <a:t>4/8/2016</a:t>
             </a:fld>
             <a:endParaRPr lang="en-US"/>
           </a:p>
@@ -10076,7 +10076,7 @@
         </p:nvSpPr>
         <p:spPr>
           <a:xfrm>
-            <a:off x="4431228" y="2286000"/>
+            <a:off x="4431228" y="1933087"/>
             <a:ext cx="978972" cy="978972"/>
           </a:xfrm>
           <a:prstGeom prst="ellipse">
@@ -10156,7 +10156,7 @@
         </p:nvSpPr>
         <p:spPr>
           <a:xfrm rot="18672083">
-            <a:off x="2164646" y="2568320"/>
+            <a:off x="2164646" y="2921233"/>
             <a:ext cx="1379725" cy="919817"/>
           </a:xfrm>
           <a:prstGeom prst="rect">
@@ -10191,7 +10191,7 @@
     </p:spTree>
     <p:extLst>
       <p:ext uri="{BB962C8B-B14F-4D97-AF65-F5344CB8AC3E}">
-        <p14:creationId xmlns:p14="http://schemas.microsoft.com/office/powerpoint/2010/main" val="3365451179"/>
+        <p14:creationId xmlns:p14="http://schemas.microsoft.com/office/powerpoint/2010/main" val="611112609"/>
       </p:ext>
     </p:extLst>
   </p:cSld>
@@ -10266,7 +10266,7 @@
         </p:nvSpPr>
         <p:spPr>
           <a:xfrm>
-            <a:off x="5196713" y="2286000"/>
+            <a:off x="5196713" y="1933087"/>
             <a:ext cx="978972" cy="978972"/>
           </a:xfrm>
           <a:prstGeom prst="ellipse">
@@ -10346,7 +10346,7 @@
         </p:nvSpPr>
         <p:spPr>
           <a:xfrm rot="18672083">
-            <a:off x="3348718" y="2568320"/>
+            <a:off x="3348718" y="2921233"/>
             <a:ext cx="1379725" cy="919817"/>
           </a:xfrm>
           <a:prstGeom prst="rect">
@@ -10381,7 +10381,7 @@
     </p:spTree>
     <p:extLst>
       <p:ext uri="{BB962C8B-B14F-4D97-AF65-F5344CB8AC3E}">
-        <p14:creationId xmlns:p14="http://schemas.microsoft.com/office/powerpoint/2010/main" val="3531855591"/>
+        <p14:creationId xmlns:p14="http://schemas.microsoft.com/office/powerpoint/2010/main" val="231759311"/>
       </p:ext>
     </p:extLst>
   </p:cSld>
@@ -10718,7 +10718,7 @@
         </p:nvSpPr>
         <p:spPr>
           <a:xfrm>
-            <a:off x="4431228" y="2286000"/>
+            <a:off x="4431228" y="1933087"/>
             <a:ext cx="978972" cy="978972"/>
           </a:xfrm>
           <a:prstGeom prst="ellipse">
@@ -10798,7 +10798,7 @@
         </p:nvSpPr>
         <p:spPr>
           <a:xfrm rot="18672083">
-            <a:off x="2164646" y="2568320"/>
+            <a:off x="2164646" y="2921233"/>
             <a:ext cx="1379725" cy="919817"/>
           </a:xfrm>
           <a:prstGeom prst="rect">
@@ -10833,7 +10833,7 @@
     </p:spTree>
     <p:extLst>
       <p:ext uri="{BB962C8B-B14F-4D97-AF65-F5344CB8AC3E}">
-        <p14:creationId xmlns:p14="http://schemas.microsoft.com/office/powerpoint/2010/main" val="696333486"/>
+        <p14:creationId xmlns:p14="http://schemas.microsoft.com/office/powerpoint/2010/main" val="3963864842"/>
       </p:ext>
     </p:extLst>
   </p:cSld>
@@ -10908,7 +10908,7 @@
         </p:nvSpPr>
         <p:spPr>
           <a:xfrm>
-            <a:off x="5196713" y="2286000"/>
+            <a:off x="5196713" y="1933087"/>
             <a:ext cx="978972" cy="978972"/>
           </a:xfrm>
           <a:prstGeom prst="ellipse">
@@ -10988,7 +10988,7 @@
         </p:nvSpPr>
         <p:spPr>
           <a:xfrm rot="18672083">
-            <a:off x="3348718" y="2568320"/>
+            <a:off x="3348718" y="2921233"/>
             <a:ext cx="1379725" cy="919817"/>
           </a:xfrm>
           <a:prstGeom prst="rect">
@@ -11023,7 +11023,7 @@
     </p:spTree>
     <p:extLst>
       <p:ext uri="{BB962C8B-B14F-4D97-AF65-F5344CB8AC3E}">
-        <p14:creationId xmlns:p14="http://schemas.microsoft.com/office/powerpoint/2010/main" val="2464534469"/>
+        <p14:creationId xmlns:p14="http://schemas.microsoft.com/office/powerpoint/2010/main" val="2103740206"/>
       </p:ext>
     </p:extLst>
   </p:cSld>
@@ -12793,7 +12793,7 @@
         </p:nvSpPr>
         <p:spPr>
           <a:xfrm>
-            <a:off x="4826239" y="2133879"/>
+            <a:off x="5054275" y="2133879"/>
             <a:ext cx="978972" cy="978972"/>
           </a:xfrm>
           <a:prstGeom prst="ellipse">
@@ -12873,7 +12873,7 @@
         </p:nvSpPr>
         <p:spPr>
           <a:xfrm rot="18672083">
-            <a:off x="3408224" y="4021378"/>
+            <a:off x="3207917" y="4021378"/>
             <a:ext cx="1379725" cy="919817"/>
           </a:xfrm>
           <a:prstGeom prst="rect">
@@ -12908,7 +12908,7 @@
     </p:spTree>
     <p:extLst>
       <p:ext uri="{BB962C8B-B14F-4D97-AF65-F5344CB8AC3E}">
-        <p14:creationId xmlns:p14="http://schemas.microsoft.com/office/powerpoint/2010/main" val="1658687741"/>
+        <p14:creationId xmlns:p14="http://schemas.microsoft.com/office/powerpoint/2010/main" val="2361019803"/>
       </p:ext>
     </p:extLst>
   </p:cSld>
@@ -13214,7 +13214,7 @@
         </p:nvSpPr>
         <p:spPr>
           <a:xfrm>
-            <a:off x="4431228" y="2317923"/>
+            <a:off x="4431228" y="2357788"/>
             <a:ext cx="978972" cy="978972"/>
           </a:xfrm>
           <a:prstGeom prst="ellipse">
@@ -13294,7 +13294,7 @@
         </p:nvSpPr>
         <p:spPr>
           <a:xfrm rot="18672083">
-            <a:off x="2164646" y="2868908"/>
+            <a:off x="2164646" y="3367739"/>
             <a:ext cx="1379725" cy="919817"/>
           </a:xfrm>
           <a:prstGeom prst="rect">
@@ -13329,7 +13329,7 @@
     </p:spTree>
     <p:extLst>
       <p:ext uri="{BB962C8B-B14F-4D97-AF65-F5344CB8AC3E}">
-        <p14:creationId xmlns:p14="http://schemas.microsoft.com/office/powerpoint/2010/main" val="1238085124"/>
+        <p14:creationId xmlns:p14="http://schemas.microsoft.com/office/powerpoint/2010/main" val="3317993789"/>
       </p:ext>
     </p:extLst>
   </p:cSld>
@@ -13404,7 +13404,7 @@
         </p:nvSpPr>
         <p:spPr>
           <a:xfrm>
-            <a:off x="4826239" y="2317923"/>
+            <a:off x="5054275" y="2357788"/>
             <a:ext cx="978972" cy="978972"/>
           </a:xfrm>
           <a:prstGeom prst="ellipse">
@@ -13484,7 +13484,7 @@
         </p:nvSpPr>
         <p:spPr>
           <a:xfrm rot="18672083">
-            <a:off x="3408224" y="2868908"/>
+            <a:off x="3207917" y="3367739"/>
             <a:ext cx="1379725" cy="919817"/>
           </a:xfrm>
           <a:prstGeom prst="rect">
@@ -13519,7 +13519,7 @@
     </p:spTree>
     <p:extLst>
       <p:ext uri="{BB962C8B-B14F-4D97-AF65-F5344CB8AC3E}">
-        <p14:creationId xmlns:p14="http://schemas.microsoft.com/office/powerpoint/2010/main" val="1555915253"/>
+        <p14:creationId xmlns:p14="http://schemas.microsoft.com/office/powerpoint/2010/main" val="4251991514"/>
       </p:ext>
     </p:extLst>
   </p:cSld>
@@ -13666,7 +13666,7 @@
         </p:nvSpPr>
         <p:spPr>
           <a:xfrm>
-            <a:off x="4826239" y="2133879"/>
+            <a:off x="5054275" y="2133879"/>
             <a:ext cx="978972" cy="978972"/>
           </a:xfrm>
           <a:prstGeom prst="ellipse">
@@ -13746,7 +13746,7 @@
         </p:nvSpPr>
         <p:spPr>
           <a:xfrm rot="18672083">
-            <a:off x="3408224" y="4021378"/>
+            <a:off x="3207917" y="4021378"/>
             <a:ext cx="1379725" cy="919817"/>
           </a:xfrm>
           <a:prstGeom prst="rect">
@@ -13781,7 +13781,7 @@
     </p:spTree>
     <p:extLst>
       <p:ext uri="{BB962C8B-B14F-4D97-AF65-F5344CB8AC3E}">
-        <p14:creationId xmlns:p14="http://schemas.microsoft.com/office/powerpoint/2010/main" val="342291378"/>
+        <p14:creationId xmlns:p14="http://schemas.microsoft.com/office/powerpoint/2010/main" val="4077778818"/>
       </p:ext>
     </p:extLst>
   </p:cSld>
@@ -13856,7 +13856,7 @@
         </p:nvSpPr>
         <p:spPr>
           <a:xfrm>
-            <a:off x="4431228" y="2317923"/>
+            <a:off x="4431228" y="2357788"/>
             <a:ext cx="978972" cy="978972"/>
           </a:xfrm>
           <a:prstGeom prst="ellipse">
@@ -13936,7 +13936,7 @@
         </p:nvSpPr>
         <p:spPr>
           <a:xfrm rot="18672083">
-            <a:off x="2164646" y="2868908"/>
+            <a:off x="2164646" y="3367739"/>
             <a:ext cx="1379725" cy="919817"/>
           </a:xfrm>
           <a:prstGeom prst="rect">
@@ -13971,7 +13971,7 @@
     </p:spTree>
     <p:extLst>
       <p:ext uri="{BB962C8B-B14F-4D97-AF65-F5344CB8AC3E}">
-        <p14:creationId xmlns:p14="http://schemas.microsoft.com/office/powerpoint/2010/main" val="241020636"/>
+        <p14:creationId xmlns:p14="http://schemas.microsoft.com/office/powerpoint/2010/main" val="1652329151"/>
       </p:ext>
     </p:extLst>
   </p:cSld>
@@ -14046,7 +14046,7 @@
         </p:nvSpPr>
         <p:spPr>
           <a:xfrm>
-            <a:off x="4826239" y="2317923"/>
+            <a:off x="5054275" y="2357788"/>
             <a:ext cx="978972" cy="978972"/>
           </a:xfrm>
           <a:prstGeom prst="ellipse">
@@ -14126,7 +14126,7 @@
         </p:nvSpPr>
         <p:spPr>
           <a:xfrm rot="18672083">
-            <a:off x="3408224" y="2868908"/>
+            <a:off x="3207917" y="3367739"/>
             <a:ext cx="1379725" cy="919817"/>
           </a:xfrm>
           <a:prstGeom prst="rect">
@@ -14161,7 +14161,7 @@
     </p:spTree>
     <p:extLst>
       <p:ext uri="{BB962C8B-B14F-4D97-AF65-F5344CB8AC3E}">
-        <p14:creationId xmlns:p14="http://schemas.microsoft.com/office/powerpoint/2010/main" val="2988402981"/>
+        <p14:creationId xmlns:p14="http://schemas.microsoft.com/office/powerpoint/2010/main" val="2010127632"/>
       </p:ext>
     </p:extLst>
   </p:cSld>

</xml_diff>